<commit_message>
Update presentatie en readme.md
</commit_message>
<xml_diff>
--- a/slides/Framework_presentatie.pptx
+++ b/slides/Framework_presentatie.pptx
@@ -7263,7 +7263,7 @@
                   <a:schemeClr val="bg1"/>
                 </a:solidFill>
               </a:rPr>
-              <a:t>Duplicatie data access logica</a:t>
+              <a:t>Voorkomt duplicatie data access logica</a:t>
             </a:r>
           </a:p>
           <a:p>
@@ -7288,37 +7288,8 @@
                   <a:schemeClr val="bg1"/>
                 </a:solidFill>
               </a:rPr>
-              <a:t>Ontkoppelt applicatie van </a:t>
-            </a:r>
-            <a:r>
-              <a:rPr lang="nl-NL" dirty="0" err="1">
-                <a:solidFill>
-                  <a:schemeClr val="bg1"/>
-                </a:solidFill>
-              </a:rPr>
-              <a:t>persistence</a:t>
-            </a:r>
-            <a:r>
-              <a:rPr lang="nl-NL" dirty="0">
-                <a:solidFill>
-                  <a:schemeClr val="bg1"/>
-                </a:solidFill>
-              </a:rPr>
-              <a:t> </a:t>
-            </a:r>
-            <a:r>
-              <a:rPr lang="nl-NL" dirty="0" err="1">
-                <a:solidFill>
-                  <a:schemeClr val="bg1"/>
-                </a:solidFill>
-              </a:rPr>
-              <a:t>frameworks</a:t>
-            </a:r>
-            <a:endParaRPr lang="nl-NL" dirty="0">
-              <a:solidFill>
-                <a:schemeClr val="bg1"/>
-              </a:solidFill>
-            </a:endParaRPr>
+              <a:t>Ontkoppelt applicatie van ORM</a:t>
+            </a:r>
           </a:p>
           <a:p>
             <a:pPr marL="342900" indent="-342900" algn="l">
@@ -7342,7 +7313,7 @@
                   <a:schemeClr val="bg1"/>
                 </a:solidFill>
               </a:rPr>
-              <a:t>Beter </a:t>
+              <a:t>Applicatie beter </a:t>
             </a:r>
             <a:r>
               <a:rPr lang="nl-NL" dirty="0" err="1">
@@ -7701,39 +7672,45 @@
             </a:lvl9pPr>
           </a:lstStyle>
           <a:p>
+            <a:pPr algn="l"/>
+            <a:r>
+              <a:rPr lang="nl-NL" dirty="0">
+                <a:solidFill>
+                  <a:schemeClr val="bg1"/>
+                </a:solidFill>
+              </a:rPr>
+              <a:t>-    Een extra abstracte laag over de data access laag (</a:t>
+            </a:r>
+            <a:r>
+              <a:rPr lang="nl-NL" dirty="0" err="1">
+                <a:solidFill>
+                  <a:schemeClr val="bg1"/>
+                </a:solidFill>
+              </a:rPr>
+              <a:t>Entity</a:t>
+            </a:r>
+            <a:r>
+              <a:rPr lang="nl-NL" dirty="0">
+                <a:solidFill>
+                  <a:schemeClr val="bg1"/>
+                </a:solidFill>
+              </a:rPr>
+              <a:t> Framework) </a:t>
+            </a:r>
+          </a:p>
+          <a:p>
             <a:pPr marL="342900" indent="-342900" algn="l">
               <a:buFontTx/>
               <a:buChar char="-"/>
             </a:pPr>
             <a:r>
-              <a:rPr lang="nl-NL" dirty="0" err="1">
+              <a:rPr lang="nl-NL" dirty="0">
                 <a:solidFill>
                   <a:schemeClr val="bg1"/>
                 </a:solidFill>
               </a:rPr>
-              <a:t>Persistence</a:t>
-            </a:r>
-            <a:r>
-              <a:rPr lang="nl-NL" dirty="0">
-                <a:solidFill>
-                  <a:schemeClr val="bg1"/>
-                </a:solidFill>
-              </a:rPr>
-              <a:t> </a:t>
-            </a:r>
-            <a:r>
-              <a:rPr lang="nl-NL" dirty="0" err="1">
-                <a:solidFill>
-                  <a:schemeClr val="bg1"/>
-                </a:solidFill>
-              </a:rPr>
-              <a:t>framework</a:t>
-            </a:r>
-            <a:endParaRPr lang="nl-NL" dirty="0">
-              <a:solidFill>
-                <a:schemeClr val="bg1"/>
-              </a:solidFill>
-            </a:endParaRPr>
+              <a:t>ORM kan gemakkelijk vervangen worden</a:t>
+            </a:r>
           </a:p>
           <a:p>
             <a:pPr marL="342900" indent="-342900" algn="l">
@@ -7746,84 +7723,6 @@
               </a:solidFill>
             </a:endParaRPr>
           </a:p>
-          <a:p>
-            <a:pPr marL="342900" indent="-342900" algn="l">
-              <a:buFontTx/>
-              <a:buChar char="-"/>
-            </a:pPr>
-            <a:r>
-              <a:rPr lang="nl-NL" dirty="0">
-                <a:solidFill>
-                  <a:schemeClr val="bg1"/>
-                </a:solidFill>
-              </a:rPr>
-              <a:t>Tijd besparen</a:t>
-            </a:r>
-          </a:p>
-          <a:p>
-            <a:pPr marL="342900" indent="-342900" algn="l">
-              <a:buFontTx/>
-              <a:buChar char="-"/>
-            </a:pPr>
-            <a:endParaRPr lang="nl-NL" dirty="0">
-              <a:solidFill>
-                <a:schemeClr val="bg1"/>
-              </a:solidFill>
-            </a:endParaRPr>
-          </a:p>
-          <a:p>
-            <a:pPr marL="342900" indent="-342900" algn="l">
-              <a:buFontTx/>
-              <a:buChar char="-"/>
-            </a:pPr>
-            <a:r>
-              <a:rPr lang="nl-NL" dirty="0">
-                <a:solidFill>
-                  <a:schemeClr val="bg1"/>
-                </a:solidFill>
-              </a:rPr>
-              <a:t>Object </a:t>
-            </a:r>
-            <a:r>
-              <a:rPr lang="nl-NL" dirty="0" err="1">
-                <a:solidFill>
-                  <a:schemeClr val="bg1"/>
-                </a:solidFill>
-              </a:rPr>
-              <a:t>Role</a:t>
-            </a:r>
-            <a:r>
-              <a:rPr lang="nl-NL" dirty="0">
-                <a:solidFill>
-                  <a:schemeClr val="bg1"/>
-                </a:solidFill>
-              </a:rPr>
-              <a:t> </a:t>
-            </a:r>
-            <a:r>
-              <a:rPr lang="nl-NL" dirty="0" err="1">
-                <a:solidFill>
-                  <a:schemeClr val="bg1"/>
-                </a:solidFill>
-              </a:rPr>
-              <a:t>Modeling</a:t>
-            </a:r>
-            <a:r>
-              <a:rPr lang="nl-NL" dirty="0">
-                <a:solidFill>
-                  <a:schemeClr val="bg1"/>
-                </a:solidFill>
-              </a:rPr>
-              <a:t> Framework</a:t>
-            </a:r>
-          </a:p>
-          <a:p>
-            <a:endParaRPr lang="nl-NL" dirty="0">
-              <a:solidFill>
-                <a:schemeClr val="bg1"/>
-              </a:solidFill>
-            </a:endParaRPr>
-          </a:p>
         </p:txBody>
       </p:sp>
       <p:sp>
@@ -7896,10 +7795,10 @@
       </p:sp>
       <p:pic>
         <p:nvPicPr>
-          <p:cNvPr id="3" name="Afbeelding 2">
-            <a:extLst>
-              <a:ext uri="{FF2B5EF4-FFF2-40B4-BE49-F238E27FC236}">
-                <a16:creationId xmlns:a16="http://schemas.microsoft.com/office/drawing/2014/main" id="{F4A04E81-CD8A-4039-B6B9-E709AF68B9D8}"/>
+          <p:cNvPr id="4" name="Afbeelding 3">
+            <a:extLst>
+              <a:ext uri="{FF2B5EF4-FFF2-40B4-BE49-F238E27FC236}">
+                <a16:creationId xmlns:a16="http://schemas.microsoft.com/office/drawing/2014/main" id="{9E16554D-B87D-4077-A250-FFD08F2DB3E1}"/>
               </a:ext>
             </a:extLst>
           </p:cNvPr>
@@ -7922,8 +7821,8 @@
         </p:blipFill>
         <p:spPr>
           <a:xfrm>
-            <a:off x="6615023" y="1886719"/>
-            <a:ext cx="5212892" cy="2767012"/>
+            <a:off x="1386413" y="3228552"/>
+            <a:ext cx="9428548" cy="3349805"/>
           </a:xfrm>
           <a:prstGeom prst="rect">
             <a:avLst/>

</xml_diff>

<commit_message>
database en update presentatie
</commit_message>
<xml_diff>
--- a/slides/Framework_presentatie.pptx
+++ b/slides/Framework_presentatie.pptx
@@ -6,8 +6,8 @@
   </p:sldMasterIdLst>
   <p:sldIdLst>
     <p:sldId id="277" r:id="rId2"/>
-    <p:sldId id="278" r:id="rId3"/>
-    <p:sldId id="279" r:id="rId4"/>
+    <p:sldId id="279" r:id="rId3"/>
+    <p:sldId id="278" r:id="rId4"/>
     <p:sldId id="256" r:id="rId5"/>
     <p:sldId id="264" r:id="rId6"/>
     <p:sldId id="265" r:id="rId7"/>
@@ -443,7 +443,7 @@
           <a:p>
             <a:fld id="{AD661F1D-CE94-482A-A334-E21065C3B5BF}" type="datetimeFigureOut">
               <a:rPr lang="nl-NL" smtClean="0"/>
-              <a:t>28-11-2019</a:t>
+              <a:t>29-11-2019</a:t>
             </a:fld>
             <a:endParaRPr lang="nl-NL"/>
           </a:p>
@@ -641,7 +641,7 @@
           <a:p>
             <a:fld id="{AD661F1D-CE94-482A-A334-E21065C3B5BF}" type="datetimeFigureOut">
               <a:rPr lang="nl-NL" smtClean="0"/>
-              <a:t>28-11-2019</a:t>
+              <a:t>29-11-2019</a:t>
             </a:fld>
             <a:endParaRPr lang="nl-NL"/>
           </a:p>
@@ -849,7 +849,7 @@
           <a:p>
             <a:fld id="{AD661F1D-CE94-482A-A334-E21065C3B5BF}" type="datetimeFigureOut">
               <a:rPr lang="nl-NL" smtClean="0"/>
-              <a:t>28-11-2019</a:t>
+              <a:t>29-11-2019</a:t>
             </a:fld>
             <a:endParaRPr lang="nl-NL"/>
           </a:p>
@@ -1047,7 +1047,7 @@
           <a:p>
             <a:fld id="{AD661F1D-CE94-482A-A334-E21065C3B5BF}" type="datetimeFigureOut">
               <a:rPr lang="nl-NL" smtClean="0"/>
-              <a:t>28-11-2019</a:t>
+              <a:t>29-11-2019</a:t>
             </a:fld>
             <a:endParaRPr lang="nl-NL"/>
           </a:p>
@@ -1322,7 +1322,7 @@
           <a:p>
             <a:fld id="{AD661F1D-CE94-482A-A334-E21065C3B5BF}" type="datetimeFigureOut">
               <a:rPr lang="nl-NL" smtClean="0"/>
-              <a:t>28-11-2019</a:t>
+              <a:t>29-11-2019</a:t>
             </a:fld>
             <a:endParaRPr lang="nl-NL"/>
           </a:p>
@@ -1587,7 +1587,7 @@
           <a:p>
             <a:fld id="{AD661F1D-CE94-482A-A334-E21065C3B5BF}" type="datetimeFigureOut">
               <a:rPr lang="nl-NL" smtClean="0"/>
-              <a:t>28-11-2019</a:t>
+              <a:t>29-11-2019</a:t>
             </a:fld>
             <a:endParaRPr lang="nl-NL"/>
           </a:p>
@@ -1999,7 +1999,7 @@
           <a:p>
             <a:fld id="{AD661F1D-CE94-482A-A334-E21065C3B5BF}" type="datetimeFigureOut">
               <a:rPr lang="nl-NL" smtClean="0"/>
-              <a:t>28-11-2019</a:t>
+              <a:t>29-11-2019</a:t>
             </a:fld>
             <a:endParaRPr lang="nl-NL"/>
           </a:p>
@@ -2140,7 +2140,7 @@
           <a:p>
             <a:fld id="{AD661F1D-CE94-482A-A334-E21065C3B5BF}" type="datetimeFigureOut">
               <a:rPr lang="nl-NL" smtClean="0"/>
-              <a:t>28-11-2019</a:t>
+              <a:t>29-11-2019</a:t>
             </a:fld>
             <a:endParaRPr lang="nl-NL"/>
           </a:p>
@@ -2253,7 +2253,7 @@
           <a:p>
             <a:fld id="{AD661F1D-CE94-482A-A334-E21065C3B5BF}" type="datetimeFigureOut">
               <a:rPr lang="nl-NL" smtClean="0"/>
-              <a:t>28-11-2019</a:t>
+              <a:t>29-11-2019</a:t>
             </a:fld>
             <a:endParaRPr lang="nl-NL"/>
           </a:p>
@@ -2564,7 +2564,7 @@
           <a:p>
             <a:fld id="{AD661F1D-CE94-482A-A334-E21065C3B5BF}" type="datetimeFigureOut">
               <a:rPr lang="nl-NL" smtClean="0"/>
-              <a:t>28-11-2019</a:t>
+              <a:t>29-11-2019</a:t>
             </a:fld>
             <a:endParaRPr lang="nl-NL"/>
           </a:p>
@@ -2852,7 +2852,7 @@
           <a:p>
             <a:fld id="{AD661F1D-CE94-482A-A334-E21065C3B5BF}" type="datetimeFigureOut">
               <a:rPr lang="nl-NL" smtClean="0"/>
-              <a:t>28-11-2019</a:t>
+              <a:t>29-11-2019</a:t>
             </a:fld>
             <a:endParaRPr lang="nl-NL"/>
           </a:p>
@@ -3093,7 +3093,7 @@
           <a:p>
             <a:fld id="{AD661F1D-CE94-482A-A334-E21065C3B5BF}" type="datetimeFigureOut">
               <a:rPr lang="nl-NL" smtClean="0"/>
-              <a:t>28-11-2019</a:t>
+              <a:t>29-11-2019</a:t>
             </a:fld>
             <a:endParaRPr lang="nl-NL"/>
           </a:p>
@@ -6388,36 +6388,6 @@
           <a:chExt cx="0" cy="0"/>
         </a:xfrm>
       </p:grpSpPr>
-      <p:sp>
-        <p:nvSpPr>
-          <p:cNvPr id="3" name="Ondertitel 2">
-            <a:extLst>
-              <a:ext uri="{FF2B5EF4-FFF2-40B4-BE49-F238E27FC236}">
-                <a16:creationId xmlns:a16="http://schemas.microsoft.com/office/drawing/2014/main" id="{E33BA47F-E0B6-48B8-9B6E-CE089A774A2F}"/>
-              </a:ext>
-            </a:extLst>
-          </p:cNvPr>
-          <p:cNvSpPr>
-            <a:spLocks noGrp="1"/>
-          </p:cNvSpPr>
-          <p:nvPr>
-            <p:ph type="subTitle" idx="1"/>
-          </p:nvPr>
-        </p:nvSpPr>
-        <p:spPr>
-          <a:xfrm>
-            <a:off x="1524000" y="3602038"/>
-            <a:ext cx="9144000" cy="1655762"/>
-          </a:xfrm>
-        </p:spPr>
-        <p:txBody>
-          <a:bodyPr/>
-          <a:lstStyle/>
-          <a:p>
-            <a:endParaRPr lang="nl-NL"/>
-          </a:p>
-        </p:txBody>
-      </p:sp>
       <p:pic>
         <p:nvPicPr>
           <p:cNvPr id="6" name="Afbeelding 5">
@@ -6456,71 +6426,202 @@
       </p:pic>
       <p:sp>
         <p:nvSpPr>
-          <p:cNvPr id="2" name="Titel 1">
-            <a:extLst>
-              <a:ext uri="{FF2B5EF4-FFF2-40B4-BE49-F238E27FC236}">
-                <a16:creationId xmlns:a16="http://schemas.microsoft.com/office/drawing/2014/main" id="{D3C07CC0-B426-4FA1-ACA6-C10A83758EA0}"/>
-              </a:ext>
-            </a:extLst>
-          </p:cNvPr>
-          <p:cNvSpPr>
-            <a:spLocks noGrp="1"/>
-          </p:cNvSpPr>
-          <p:nvPr>
-            <p:ph type="ctrTitle"/>
-          </p:nvPr>
+          <p:cNvPr id="7" name="Ondertitel 2">
+            <a:extLst>
+              <a:ext uri="{FF2B5EF4-FFF2-40B4-BE49-F238E27FC236}">
+                <a16:creationId xmlns:a16="http://schemas.microsoft.com/office/drawing/2014/main" id="{C8A7217A-CA09-4F92-BB8B-040FAE5EF125}"/>
+              </a:ext>
+            </a:extLst>
+          </p:cNvPr>
+          <p:cNvSpPr txBox="1">
+            <a:spLocks/>
+          </p:cNvSpPr>
+          <p:nvPr/>
         </p:nvSpPr>
         <p:spPr>
           <a:xfrm>
-            <a:off x="1524000" y="607219"/>
-            <a:ext cx="9144000" cy="2387600"/>
-          </a:xfrm>
-        </p:spPr>
-        <p:txBody>
-          <a:bodyPr/>
-          <a:lstStyle/>
-          <a:p>
-            <a:r>
-              <a:rPr lang="nl-NL" dirty="0">
-                <a:solidFill>
-                  <a:schemeClr val="bg1"/>
-                </a:solidFill>
-              </a:rPr>
-              <a:t>Doelen</a:t>
-            </a:r>
-          </a:p>
-        </p:txBody>
-      </p:sp>
-      <p:sp>
-        <p:nvSpPr>
-          <p:cNvPr id="4" name="Tekstvak 3">
-            <a:extLst>
-              <a:ext uri="{FF2B5EF4-FFF2-40B4-BE49-F238E27FC236}">
-                <a16:creationId xmlns:a16="http://schemas.microsoft.com/office/drawing/2014/main" id="{489E2ABD-4449-4674-9407-12EC98C5BA5D}"/>
-              </a:ext>
-            </a:extLst>
-          </p:cNvPr>
-          <p:cNvSpPr txBox="1"/>
-          <p:nvPr/>
-        </p:nvSpPr>
-        <p:spPr>
-          <a:xfrm>
-            <a:off x="1524000" y="3602038"/>
-            <a:ext cx="9144000" cy="1508105"/>
+            <a:off x="1524000" y="2127380"/>
+            <a:ext cx="9144000" cy="3107093"/>
           </a:xfrm>
           <a:prstGeom prst="rect">
             <a:avLst/>
           </a:prstGeom>
-          <a:noFill/>
         </p:spPr>
         <p:txBody>
-          <a:bodyPr wrap="square" rtlCol="0">
-            <a:spAutoFit/>
+          <a:bodyPr vert="horz" lIns="91440" tIns="45720" rIns="91440" bIns="45720" rtlCol="0">
+            <a:normAutofit/>
           </a:bodyPr>
-          <a:lstStyle/>
-          <a:p>
-            <a:r>
-              <a:rPr lang="nl-NL" sz="2000" dirty="0" err="1">
+          <a:lstStyle>
+            <a:lvl1pPr marL="0" indent="0" algn="ctr" defTabSz="914400" rtl="0" eaLnBrk="1" latinLnBrk="0" hangingPunct="1">
+              <a:lnSpc>
+                <a:spcPct val="90000"/>
+              </a:lnSpc>
+              <a:spcBef>
+                <a:spcPts val="1000"/>
+              </a:spcBef>
+              <a:buFont typeface="Arial" panose="020B0604020202020204" pitchFamily="34" charset="0"/>
+              <a:buNone/>
+              <a:defRPr sz="2400" kern="1200">
+                <a:solidFill>
+                  <a:schemeClr val="tx1"/>
+                </a:solidFill>
+                <a:latin typeface="+mn-lt"/>
+                <a:ea typeface="+mn-ea"/>
+                <a:cs typeface="+mn-cs"/>
+              </a:defRPr>
+            </a:lvl1pPr>
+            <a:lvl2pPr marL="457200" indent="0" algn="ctr" defTabSz="914400" rtl="0" eaLnBrk="1" latinLnBrk="0" hangingPunct="1">
+              <a:lnSpc>
+                <a:spcPct val="90000"/>
+              </a:lnSpc>
+              <a:spcBef>
+                <a:spcPts val="500"/>
+              </a:spcBef>
+              <a:buFont typeface="Arial" panose="020B0604020202020204" pitchFamily="34" charset="0"/>
+              <a:buNone/>
+              <a:defRPr sz="2000" kern="1200">
+                <a:solidFill>
+                  <a:schemeClr val="tx1"/>
+                </a:solidFill>
+                <a:latin typeface="+mn-lt"/>
+                <a:ea typeface="+mn-ea"/>
+                <a:cs typeface="+mn-cs"/>
+              </a:defRPr>
+            </a:lvl2pPr>
+            <a:lvl3pPr marL="914400" indent="0" algn="ctr" defTabSz="914400" rtl="0" eaLnBrk="1" latinLnBrk="0" hangingPunct="1">
+              <a:lnSpc>
+                <a:spcPct val="90000"/>
+              </a:lnSpc>
+              <a:spcBef>
+                <a:spcPts val="500"/>
+              </a:spcBef>
+              <a:buFont typeface="Arial" panose="020B0604020202020204" pitchFamily="34" charset="0"/>
+              <a:buNone/>
+              <a:defRPr sz="1800" kern="1200">
+                <a:solidFill>
+                  <a:schemeClr val="tx1"/>
+                </a:solidFill>
+                <a:latin typeface="+mn-lt"/>
+                <a:ea typeface="+mn-ea"/>
+                <a:cs typeface="+mn-cs"/>
+              </a:defRPr>
+            </a:lvl3pPr>
+            <a:lvl4pPr marL="1371600" indent="0" algn="ctr" defTabSz="914400" rtl="0" eaLnBrk="1" latinLnBrk="0" hangingPunct="1">
+              <a:lnSpc>
+                <a:spcPct val="90000"/>
+              </a:lnSpc>
+              <a:spcBef>
+                <a:spcPts val="500"/>
+              </a:spcBef>
+              <a:buFont typeface="Arial" panose="020B0604020202020204" pitchFamily="34" charset="0"/>
+              <a:buNone/>
+              <a:defRPr sz="1600" kern="1200">
+                <a:solidFill>
+                  <a:schemeClr val="tx1"/>
+                </a:solidFill>
+                <a:latin typeface="+mn-lt"/>
+                <a:ea typeface="+mn-ea"/>
+                <a:cs typeface="+mn-cs"/>
+              </a:defRPr>
+            </a:lvl4pPr>
+            <a:lvl5pPr marL="1828800" indent="0" algn="ctr" defTabSz="914400" rtl="0" eaLnBrk="1" latinLnBrk="0" hangingPunct="1">
+              <a:lnSpc>
+                <a:spcPct val="90000"/>
+              </a:lnSpc>
+              <a:spcBef>
+                <a:spcPts val="500"/>
+              </a:spcBef>
+              <a:buFont typeface="Arial" panose="020B0604020202020204" pitchFamily="34" charset="0"/>
+              <a:buNone/>
+              <a:defRPr sz="1600" kern="1200">
+                <a:solidFill>
+                  <a:schemeClr val="tx1"/>
+                </a:solidFill>
+                <a:latin typeface="+mn-lt"/>
+                <a:ea typeface="+mn-ea"/>
+                <a:cs typeface="+mn-cs"/>
+              </a:defRPr>
+            </a:lvl5pPr>
+            <a:lvl6pPr marL="2286000" indent="0" algn="ctr" defTabSz="914400" rtl="0" eaLnBrk="1" latinLnBrk="0" hangingPunct="1">
+              <a:lnSpc>
+                <a:spcPct val="90000"/>
+              </a:lnSpc>
+              <a:spcBef>
+                <a:spcPts val="500"/>
+              </a:spcBef>
+              <a:buFont typeface="Arial" panose="020B0604020202020204" pitchFamily="34" charset="0"/>
+              <a:buNone/>
+              <a:defRPr sz="1600" kern="1200">
+                <a:solidFill>
+                  <a:schemeClr val="tx1"/>
+                </a:solidFill>
+                <a:latin typeface="+mn-lt"/>
+                <a:ea typeface="+mn-ea"/>
+                <a:cs typeface="+mn-cs"/>
+              </a:defRPr>
+            </a:lvl6pPr>
+            <a:lvl7pPr marL="2743200" indent="0" algn="ctr" defTabSz="914400" rtl="0" eaLnBrk="1" latinLnBrk="0" hangingPunct="1">
+              <a:lnSpc>
+                <a:spcPct val="90000"/>
+              </a:lnSpc>
+              <a:spcBef>
+                <a:spcPts val="500"/>
+              </a:spcBef>
+              <a:buFont typeface="Arial" panose="020B0604020202020204" pitchFamily="34" charset="0"/>
+              <a:buNone/>
+              <a:defRPr sz="1600" kern="1200">
+                <a:solidFill>
+                  <a:schemeClr val="tx1"/>
+                </a:solidFill>
+                <a:latin typeface="+mn-lt"/>
+                <a:ea typeface="+mn-ea"/>
+                <a:cs typeface="+mn-cs"/>
+              </a:defRPr>
+            </a:lvl7pPr>
+            <a:lvl8pPr marL="3200400" indent="0" algn="ctr" defTabSz="914400" rtl="0" eaLnBrk="1" latinLnBrk="0" hangingPunct="1">
+              <a:lnSpc>
+                <a:spcPct val="90000"/>
+              </a:lnSpc>
+              <a:spcBef>
+                <a:spcPts val="500"/>
+              </a:spcBef>
+              <a:buFont typeface="Arial" panose="020B0604020202020204" pitchFamily="34" charset="0"/>
+              <a:buNone/>
+              <a:defRPr sz="1600" kern="1200">
+                <a:solidFill>
+                  <a:schemeClr val="tx1"/>
+                </a:solidFill>
+                <a:latin typeface="+mn-lt"/>
+                <a:ea typeface="+mn-ea"/>
+                <a:cs typeface="+mn-cs"/>
+              </a:defRPr>
+            </a:lvl8pPr>
+            <a:lvl9pPr marL="3657600" indent="0" algn="ctr" defTabSz="914400" rtl="0" eaLnBrk="1" latinLnBrk="0" hangingPunct="1">
+              <a:lnSpc>
+                <a:spcPct val="90000"/>
+              </a:lnSpc>
+              <a:spcBef>
+                <a:spcPts val="500"/>
+              </a:spcBef>
+              <a:buFont typeface="Arial" panose="020B0604020202020204" pitchFamily="34" charset="0"/>
+              <a:buNone/>
+              <a:defRPr sz="1600" kern="1200">
+                <a:solidFill>
+                  <a:schemeClr val="tx1"/>
+                </a:solidFill>
+                <a:latin typeface="+mn-lt"/>
+                <a:ea typeface="+mn-ea"/>
+                <a:cs typeface="+mn-cs"/>
+              </a:defRPr>
+            </a:lvl9pPr>
+          </a:lstStyle>
+          <a:p>
+            <a:pPr marL="342900" indent="-342900" algn="l">
+              <a:buFont typeface="Arial" panose="020B0604020202020204" pitchFamily="34" charset="0"/>
+              <a:buChar char="•"/>
+            </a:pPr>
+            <a:r>
+              <a:rPr lang="nl-NL" dirty="0" err="1">
                 <a:solidFill>
                   <a:schemeClr val="bg1"/>
                 </a:solidFill>
@@ -6528,63 +6629,19 @@
               <a:t>Entity</a:t>
             </a:r>
             <a:r>
-              <a:rPr lang="nl-NL" sz="2000" dirty="0">
-                <a:solidFill>
-                  <a:schemeClr val="bg1"/>
-                </a:solidFill>
-              </a:rPr>
-              <a:t> </a:t>
-            </a:r>
-            <a:r>
-              <a:rPr lang="nl-NL" sz="2000" dirty="0" err="1">
-                <a:solidFill>
-                  <a:schemeClr val="bg1"/>
-                </a:solidFill>
-              </a:rPr>
-              <a:t>framework</a:t>
-            </a:r>
-            <a:r>
-              <a:rPr lang="nl-NL" sz="2000" dirty="0">
-                <a:solidFill>
-                  <a:schemeClr val="bg1"/>
-                </a:solidFill>
-              </a:rPr>
-              <a:t> &amp; </a:t>
-            </a:r>
-            <a:r>
-              <a:rPr lang="nl-NL" sz="2000" dirty="0" err="1">
-                <a:solidFill>
-                  <a:schemeClr val="bg1"/>
-                </a:solidFill>
-              </a:rPr>
-              <a:t>Repository</a:t>
-            </a:r>
-            <a:r>
-              <a:rPr lang="nl-NL" sz="2000" dirty="0">
-                <a:solidFill>
-                  <a:schemeClr val="bg1"/>
-                </a:solidFill>
-              </a:rPr>
-              <a:t> </a:t>
-            </a:r>
-            <a:r>
-              <a:rPr lang="nl-NL" sz="2000" dirty="0" err="1">
-                <a:solidFill>
-                  <a:schemeClr val="bg1"/>
-                </a:solidFill>
-              </a:rPr>
-              <a:t>pattern</a:t>
-            </a:r>
-            <a:r>
               <a:rPr lang="nl-NL" dirty="0">
                 <a:solidFill>
                   <a:schemeClr val="bg1"/>
                 </a:solidFill>
               </a:rPr>
-              <a:t>	</a:t>
-            </a:r>
-          </a:p>
-          <a:p>
+              <a:t> Framework</a:t>
+            </a:r>
+          </a:p>
+          <a:p>
+            <a:pPr marL="342900" indent="-342900" algn="l">
+              <a:buFont typeface="Arial" panose="020B0604020202020204" pitchFamily="34" charset="0"/>
+              <a:buChar char="•"/>
+            </a:pPr>
             <a:endParaRPr lang="nl-NL" dirty="0">
               <a:solidFill>
                 <a:schemeClr val="bg1"/>
@@ -6592,81 +6649,121 @@
             </a:endParaRPr>
           </a:p>
           <a:p>
+            <a:pPr marL="342900" indent="-342900" algn="l">
+              <a:buFont typeface="Arial" panose="020B0604020202020204" pitchFamily="34" charset="0"/>
+              <a:buChar char="•"/>
+            </a:pPr>
+            <a:r>
+              <a:rPr lang="nl-NL" dirty="0" err="1">
+                <a:solidFill>
+                  <a:schemeClr val="bg1"/>
+                </a:solidFill>
+              </a:rPr>
+              <a:t>Repository</a:t>
+            </a:r>
             <a:r>
               <a:rPr lang="nl-NL" dirty="0">
                 <a:solidFill>
                   <a:schemeClr val="bg1"/>
                 </a:solidFill>
               </a:rPr>
-              <a:t>              Wat zijn deze onderwerpen				Wat is dit</a:t>
-            </a:r>
-          </a:p>
-          <a:p>
+              <a:t> </a:t>
+            </a:r>
+            <a:r>
+              <a:rPr lang="nl-NL" dirty="0" err="1">
+                <a:solidFill>
+                  <a:schemeClr val="bg1"/>
+                </a:solidFill>
+              </a:rPr>
+              <a:t>pattern</a:t>
+            </a:r>
+            <a:endParaRPr lang="nl-NL" dirty="0">
+              <a:solidFill>
+                <a:schemeClr val="bg1"/>
+              </a:solidFill>
+            </a:endParaRPr>
+          </a:p>
+          <a:p>
+            <a:pPr marL="342900" indent="-342900" algn="l">
+              <a:buFont typeface="Arial" panose="020B0604020202020204" pitchFamily="34" charset="0"/>
+              <a:buChar char="•"/>
+            </a:pPr>
+            <a:endParaRPr lang="nl-NL" dirty="0">
+              <a:solidFill>
+                <a:schemeClr val="bg1"/>
+              </a:solidFill>
+            </a:endParaRPr>
+          </a:p>
+          <a:p>
+            <a:pPr marL="342900" indent="-342900" algn="l">
+              <a:buFont typeface="Arial" panose="020B0604020202020204" pitchFamily="34" charset="0"/>
+              <a:buChar char="•"/>
+            </a:pPr>
+            <a:r>
+              <a:rPr lang="nl-NL" dirty="0" err="1">
+                <a:solidFill>
+                  <a:schemeClr val="bg1"/>
+                </a:solidFill>
+              </a:rPr>
+              <a:t>Sensitive</a:t>
+            </a:r>
             <a:r>
               <a:rPr lang="nl-NL" dirty="0">
                 <a:solidFill>
                   <a:schemeClr val="bg1"/>
                 </a:solidFill>
               </a:rPr>
-              <a:t>	                  &amp;					       &amp;</a:t>
-            </a:r>
-          </a:p>
-          <a:p>
-            <a:r>
-              <a:rPr lang="nl-NL" dirty="0">
-                <a:solidFill>
-                  <a:schemeClr val="bg1"/>
-                </a:solidFill>
-              </a:rPr>
-              <a:t>               Hoe implementeer ik deze			          Hoe voorkom ik dit</a:t>
-            </a:r>
-          </a:p>
-        </p:txBody>
-      </p:sp>
-      <p:sp>
-        <p:nvSpPr>
-          <p:cNvPr id="7" name="Tekstvak 6">
-            <a:extLst>
-              <a:ext uri="{FF2B5EF4-FFF2-40B4-BE49-F238E27FC236}">
-                <a16:creationId xmlns:a16="http://schemas.microsoft.com/office/drawing/2014/main" id="{52FA46D1-5F5E-45F6-97A5-5D4EC36A8921}"/>
-              </a:ext>
-            </a:extLst>
-          </p:cNvPr>
-          <p:cNvSpPr txBox="1"/>
-          <p:nvPr/>
+              <a:t> Data Exposure</a:t>
+            </a:r>
+          </a:p>
+          <a:p>
+            <a:pPr marL="342900" indent="-342900" algn="l">
+              <a:buFont typeface="Arial" panose="020B0604020202020204" pitchFamily="34" charset="0"/>
+              <a:buChar char="•"/>
+            </a:pPr>
+            <a:endParaRPr lang="nl-NL" dirty="0">
+              <a:solidFill>
+                <a:schemeClr val="bg1"/>
+              </a:solidFill>
+            </a:endParaRPr>
+          </a:p>
+        </p:txBody>
+      </p:sp>
+      <p:sp>
+        <p:nvSpPr>
+          <p:cNvPr id="10" name="Titel 1">
+            <a:extLst>
+              <a:ext uri="{FF2B5EF4-FFF2-40B4-BE49-F238E27FC236}">
+                <a16:creationId xmlns:a16="http://schemas.microsoft.com/office/drawing/2014/main" id="{F5A54F81-B54C-4D4D-BD79-C7DB99EFF519}"/>
+              </a:ext>
+            </a:extLst>
+          </p:cNvPr>
+          <p:cNvSpPr>
+            <a:spLocks noGrp="1"/>
+          </p:cNvSpPr>
+          <p:nvPr>
+            <p:ph type="ctrTitle"/>
+          </p:nvPr>
         </p:nvSpPr>
         <p:spPr>
           <a:xfrm>
-            <a:off x="1524000" y="3602038"/>
-            <a:ext cx="8478253" cy="461665"/>
+            <a:off x="1524000" y="1122363"/>
+            <a:ext cx="9144000" cy="137270"/>
           </a:xfrm>
-          <a:prstGeom prst="rect">
-            <a:avLst/>
-          </a:prstGeom>
-          <a:noFill/>
         </p:spPr>
         <p:txBody>
-          <a:bodyPr wrap="square" rtlCol="0">
-            <a:spAutoFit/>
+          <a:bodyPr>
+            <a:noAutofit/>
           </a:bodyPr>
           <a:lstStyle/>
           <a:p>
-            <a:pPr algn="r"/>
-            <a:r>
-              <a:rPr lang="nl-NL" sz="2400" dirty="0" err="1">
-                <a:solidFill>
-                  <a:schemeClr val="bg1"/>
-                </a:solidFill>
-              </a:rPr>
-              <a:t>Sensitive</a:t>
-            </a:r>
-            <a:r>
-              <a:rPr lang="nl-NL" sz="2400" dirty="0">
-                <a:solidFill>
-                  <a:schemeClr val="bg1"/>
-                </a:solidFill>
-              </a:rPr>
-              <a:t> Data Exposure</a:t>
+            <a:r>
+              <a:rPr lang="nl-NL" sz="3600" dirty="0">
+                <a:solidFill>
+                  <a:schemeClr val="bg1"/>
+                </a:solidFill>
+              </a:rPr>
+              <a:t>Inhoud</a:t>
             </a:r>
           </a:p>
         </p:txBody>
@@ -6674,7 +6771,7 @@
     </p:spTree>
     <p:extLst>
       <p:ext uri="{BB962C8B-B14F-4D97-AF65-F5344CB8AC3E}">
-        <p14:creationId xmlns:p14="http://schemas.microsoft.com/office/powerpoint/2010/main" val="4129991484"/>
+        <p14:creationId xmlns:p14="http://schemas.microsoft.com/office/powerpoint/2010/main" val="77825839"/>
       </p:ext>
     </p:extLst>
   </p:cSld>
@@ -6709,6 +6806,36 @@
           <a:chExt cx="0" cy="0"/>
         </a:xfrm>
       </p:grpSpPr>
+      <p:sp>
+        <p:nvSpPr>
+          <p:cNvPr id="3" name="Ondertitel 2">
+            <a:extLst>
+              <a:ext uri="{FF2B5EF4-FFF2-40B4-BE49-F238E27FC236}">
+                <a16:creationId xmlns:a16="http://schemas.microsoft.com/office/drawing/2014/main" id="{E33BA47F-E0B6-48B8-9B6E-CE089A774A2F}"/>
+              </a:ext>
+            </a:extLst>
+          </p:cNvPr>
+          <p:cNvSpPr>
+            <a:spLocks noGrp="1"/>
+          </p:cNvSpPr>
+          <p:nvPr>
+            <p:ph type="subTitle" idx="1"/>
+          </p:nvPr>
+        </p:nvSpPr>
+        <p:spPr>
+          <a:xfrm>
+            <a:off x="1524000" y="3602038"/>
+            <a:ext cx="9144000" cy="1655762"/>
+          </a:xfrm>
+        </p:spPr>
+        <p:txBody>
+          <a:bodyPr/>
+          <a:lstStyle/>
+          <a:p>
+            <a:endParaRPr lang="nl-NL"/>
+          </a:p>
+        </p:txBody>
+      </p:sp>
       <p:pic>
         <p:nvPicPr>
           <p:cNvPr id="6" name="Afbeelding 5">
@@ -6747,202 +6874,71 @@
       </p:pic>
       <p:sp>
         <p:nvSpPr>
-          <p:cNvPr id="7" name="Ondertitel 2">
-            <a:extLst>
-              <a:ext uri="{FF2B5EF4-FFF2-40B4-BE49-F238E27FC236}">
-                <a16:creationId xmlns:a16="http://schemas.microsoft.com/office/drawing/2014/main" id="{C8A7217A-CA09-4F92-BB8B-040FAE5EF125}"/>
-              </a:ext>
-            </a:extLst>
-          </p:cNvPr>
-          <p:cNvSpPr txBox="1">
-            <a:spLocks/>
-          </p:cNvSpPr>
-          <p:nvPr/>
+          <p:cNvPr id="2" name="Titel 1">
+            <a:extLst>
+              <a:ext uri="{FF2B5EF4-FFF2-40B4-BE49-F238E27FC236}">
+                <a16:creationId xmlns:a16="http://schemas.microsoft.com/office/drawing/2014/main" id="{D3C07CC0-B426-4FA1-ACA6-C10A83758EA0}"/>
+              </a:ext>
+            </a:extLst>
+          </p:cNvPr>
+          <p:cNvSpPr>
+            <a:spLocks noGrp="1"/>
+          </p:cNvSpPr>
+          <p:nvPr>
+            <p:ph type="ctrTitle"/>
+          </p:nvPr>
         </p:nvSpPr>
         <p:spPr>
           <a:xfrm>
-            <a:off x="1524000" y="2127380"/>
-            <a:ext cx="9144000" cy="3107093"/>
+            <a:off x="1524000" y="607219"/>
+            <a:ext cx="9144000" cy="2387600"/>
+          </a:xfrm>
+        </p:spPr>
+        <p:txBody>
+          <a:bodyPr/>
+          <a:lstStyle/>
+          <a:p>
+            <a:r>
+              <a:rPr lang="nl-NL" dirty="0">
+                <a:solidFill>
+                  <a:schemeClr val="bg1"/>
+                </a:solidFill>
+              </a:rPr>
+              <a:t>Doelen</a:t>
+            </a:r>
+          </a:p>
+        </p:txBody>
+      </p:sp>
+      <p:sp>
+        <p:nvSpPr>
+          <p:cNvPr id="4" name="Tekstvak 3">
+            <a:extLst>
+              <a:ext uri="{FF2B5EF4-FFF2-40B4-BE49-F238E27FC236}">
+                <a16:creationId xmlns:a16="http://schemas.microsoft.com/office/drawing/2014/main" id="{489E2ABD-4449-4674-9407-12EC98C5BA5D}"/>
+              </a:ext>
+            </a:extLst>
+          </p:cNvPr>
+          <p:cNvSpPr txBox="1"/>
+          <p:nvPr/>
+        </p:nvSpPr>
+        <p:spPr>
+          <a:xfrm>
+            <a:off x="1524000" y="3602038"/>
+            <a:ext cx="9144000" cy="1508105"/>
           </a:xfrm>
           <a:prstGeom prst="rect">
             <a:avLst/>
           </a:prstGeom>
+          <a:noFill/>
         </p:spPr>
         <p:txBody>
-          <a:bodyPr vert="horz" lIns="91440" tIns="45720" rIns="91440" bIns="45720" rtlCol="0">
-            <a:normAutofit/>
+          <a:bodyPr wrap="square" rtlCol="0">
+            <a:spAutoFit/>
           </a:bodyPr>
-          <a:lstStyle>
-            <a:lvl1pPr marL="0" indent="0" algn="ctr" defTabSz="914400" rtl="0" eaLnBrk="1" latinLnBrk="0" hangingPunct="1">
-              <a:lnSpc>
-                <a:spcPct val="90000"/>
-              </a:lnSpc>
-              <a:spcBef>
-                <a:spcPts val="1000"/>
-              </a:spcBef>
-              <a:buFont typeface="Arial" panose="020B0604020202020204" pitchFamily="34" charset="0"/>
-              <a:buNone/>
-              <a:defRPr sz="2400" kern="1200">
-                <a:solidFill>
-                  <a:schemeClr val="tx1"/>
-                </a:solidFill>
-                <a:latin typeface="+mn-lt"/>
-                <a:ea typeface="+mn-ea"/>
-                <a:cs typeface="+mn-cs"/>
-              </a:defRPr>
-            </a:lvl1pPr>
-            <a:lvl2pPr marL="457200" indent="0" algn="ctr" defTabSz="914400" rtl="0" eaLnBrk="1" latinLnBrk="0" hangingPunct="1">
-              <a:lnSpc>
-                <a:spcPct val="90000"/>
-              </a:lnSpc>
-              <a:spcBef>
-                <a:spcPts val="500"/>
-              </a:spcBef>
-              <a:buFont typeface="Arial" panose="020B0604020202020204" pitchFamily="34" charset="0"/>
-              <a:buNone/>
-              <a:defRPr sz="2000" kern="1200">
-                <a:solidFill>
-                  <a:schemeClr val="tx1"/>
-                </a:solidFill>
-                <a:latin typeface="+mn-lt"/>
-                <a:ea typeface="+mn-ea"/>
-                <a:cs typeface="+mn-cs"/>
-              </a:defRPr>
-            </a:lvl2pPr>
-            <a:lvl3pPr marL="914400" indent="0" algn="ctr" defTabSz="914400" rtl="0" eaLnBrk="1" latinLnBrk="0" hangingPunct="1">
-              <a:lnSpc>
-                <a:spcPct val="90000"/>
-              </a:lnSpc>
-              <a:spcBef>
-                <a:spcPts val="500"/>
-              </a:spcBef>
-              <a:buFont typeface="Arial" panose="020B0604020202020204" pitchFamily="34" charset="0"/>
-              <a:buNone/>
-              <a:defRPr sz="1800" kern="1200">
-                <a:solidFill>
-                  <a:schemeClr val="tx1"/>
-                </a:solidFill>
-                <a:latin typeface="+mn-lt"/>
-                <a:ea typeface="+mn-ea"/>
-                <a:cs typeface="+mn-cs"/>
-              </a:defRPr>
-            </a:lvl3pPr>
-            <a:lvl4pPr marL="1371600" indent="0" algn="ctr" defTabSz="914400" rtl="0" eaLnBrk="1" latinLnBrk="0" hangingPunct="1">
-              <a:lnSpc>
-                <a:spcPct val="90000"/>
-              </a:lnSpc>
-              <a:spcBef>
-                <a:spcPts val="500"/>
-              </a:spcBef>
-              <a:buFont typeface="Arial" panose="020B0604020202020204" pitchFamily="34" charset="0"/>
-              <a:buNone/>
-              <a:defRPr sz="1600" kern="1200">
-                <a:solidFill>
-                  <a:schemeClr val="tx1"/>
-                </a:solidFill>
-                <a:latin typeface="+mn-lt"/>
-                <a:ea typeface="+mn-ea"/>
-                <a:cs typeface="+mn-cs"/>
-              </a:defRPr>
-            </a:lvl4pPr>
-            <a:lvl5pPr marL="1828800" indent="0" algn="ctr" defTabSz="914400" rtl="0" eaLnBrk="1" latinLnBrk="0" hangingPunct="1">
-              <a:lnSpc>
-                <a:spcPct val="90000"/>
-              </a:lnSpc>
-              <a:spcBef>
-                <a:spcPts val="500"/>
-              </a:spcBef>
-              <a:buFont typeface="Arial" panose="020B0604020202020204" pitchFamily="34" charset="0"/>
-              <a:buNone/>
-              <a:defRPr sz="1600" kern="1200">
-                <a:solidFill>
-                  <a:schemeClr val="tx1"/>
-                </a:solidFill>
-                <a:latin typeface="+mn-lt"/>
-                <a:ea typeface="+mn-ea"/>
-                <a:cs typeface="+mn-cs"/>
-              </a:defRPr>
-            </a:lvl5pPr>
-            <a:lvl6pPr marL="2286000" indent="0" algn="ctr" defTabSz="914400" rtl="0" eaLnBrk="1" latinLnBrk="0" hangingPunct="1">
-              <a:lnSpc>
-                <a:spcPct val="90000"/>
-              </a:lnSpc>
-              <a:spcBef>
-                <a:spcPts val="500"/>
-              </a:spcBef>
-              <a:buFont typeface="Arial" panose="020B0604020202020204" pitchFamily="34" charset="0"/>
-              <a:buNone/>
-              <a:defRPr sz="1600" kern="1200">
-                <a:solidFill>
-                  <a:schemeClr val="tx1"/>
-                </a:solidFill>
-                <a:latin typeface="+mn-lt"/>
-                <a:ea typeface="+mn-ea"/>
-                <a:cs typeface="+mn-cs"/>
-              </a:defRPr>
-            </a:lvl6pPr>
-            <a:lvl7pPr marL="2743200" indent="0" algn="ctr" defTabSz="914400" rtl="0" eaLnBrk="1" latinLnBrk="0" hangingPunct="1">
-              <a:lnSpc>
-                <a:spcPct val="90000"/>
-              </a:lnSpc>
-              <a:spcBef>
-                <a:spcPts val="500"/>
-              </a:spcBef>
-              <a:buFont typeface="Arial" panose="020B0604020202020204" pitchFamily="34" charset="0"/>
-              <a:buNone/>
-              <a:defRPr sz="1600" kern="1200">
-                <a:solidFill>
-                  <a:schemeClr val="tx1"/>
-                </a:solidFill>
-                <a:latin typeface="+mn-lt"/>
-                <a:ea typeface="+mn-ea"/>
-                <a:cs typeface="+mn-cs"/>
-              </a:defRPr>
-            </a:lvl7pPr>
-            <a:lvl8pPr marL="3200400" indent="0" algn="ctr" defTabSz="914400" rtl="0" eaLnBrk="1" latinLnBrk="0" hangingPunct="1">
-              <a:lnSpc>
-                <a:spcPct val="90000"/>
-              </a:lnSpc>
-              <a:spcBef>
-                <a:spcPts val="500"/>
-              </a:spcBef>
-              <a:buFont typeface="Arial" panose="020B0604020202020204" pitchFamily="34" charset="0"/>
-              <a:buNone/>
-              <a:defRPr sz="1600" kern="1200">
-                <a:solidFill>
-                  <a:schemeClr val="tx1"/>
-                </a:solidFill>
-                <a:latin typeface="+mn-lt"/>
-                <a:ea typeface="+mn-ea"/>
-                <a:cs typeface="+mn-cs"/>
-              </a:defRPr>
-            </a:lvl8pPr>
-            <a:lvl9pPr marL="3657600" indent="0" algn="ctr" defTabSz="914400" rtl="0" eaLnBrk="1" latinLnBrk="0" hangingPunct="1">
-              <a:lnSpc>
-                <a:spcPct val="90000"/>
-              </a:lnSpc>
-              <a:spcBef>
-                <a:spcPts val="500"/>
-              </a:spcBef>
-              <a:buFont typeface="Arial" panose="020B0604020202020204" pitchFamily="34" charset="0"/>
-              <a:buNone/>
-              <a:defRPr sz="1600" kern="1200">
-                <a:solidFill>
-                  <a:schemeClr val="tx1"/>
-                </a:solidFill>
-                <a:latin typeface="+mn-lt"/>
-                <a:ea typeface="+mn-ea"/>
-                <a:cs typeface="+mn-cs"/>
-              </a:defRPr>
-            </a:lvl9pPr>
-          </a:lstStyle>
-          <a:p>
-            <a:pPr marL="342900" indent="-342900" algn="l">
-              <a:buFont typeface="Arial" panose="020B0604020202020204" pitchFamily="34" charset="0"/>
-              <a:buChar char="•"/>
-            </a:pPr>
-            <a:r>
-              <a:rPr lang="nl-NL" dirty="0" err="1">
+          <a:lstStyle/>
+          <a:p>
+            <a:r>
+              <a:rPr lang="nl-NL" sz="2000" dirty="0" err="1">
                 <a:solidFill>
                   <a:schemeClr val="bg1"/>
                 </a:solidFill>
@@ -6950,19 +6946,63 @@
               <a:t>Entity</a:t>
             </a:r>
             <a:r>
+              <a:rPr lang="nl-NL" sz="2000" dirty="0">
+                <a:solidFill>
+                  <a:schemeClr val="bg1"/>
+                </a:solidFill>
+              </a:rPr>
+              <a:t> </a:t>
+            </a:r>
+            <a:r>
+              <a:rPr lang="nl-NL" sz="2000" dirty="0" err="1">
+                <a:solidFill>
+                  <a:schemeClr val="bg1"/>
+                </a:solidFill>
+              </a:rPr>
+              <a:t>framework</a:t>
+            </a:r>
+            <a:r>
+              <a:rPr lang="nl-NL" sz="2000" dirty="0">
+                <a:solidFill>
+                  <a:schemeClr val="bg1"/>
+                </a:solidFill>
+              </a:rPr>
+              <a:t> &amp; </a:t>
+            </a:r>
+            <a:r>
+              <a:rPr lang="nl-NL" sz="2000" dirty="0" err="1">
+                <a:solidFill>
+                  <a:schemeClr val="bg1"/>
+                </a:solidFill>
+              </a:rPr>
+              <a:t>Repository</a:t>
+            </a:r>
+            <a:r>
+              <a:rPr lang="nl-NL" sz="2000" dirty="0">
+                <a:solidFill>
+                  <a:schemeClr val="bg1"/>
+                </a:solidFill>
+              </a:rPr>
+              <a:t> </a:t>
+            </a:r>
+            <a:r>
+              <a:rPr lang="nl-NL" sz="2000" dirty="0" err="1">
+                <a:solidFill>
+                  <a:schemeClr val="bg1"/>
+                </a:solidFill>
+              </a:rPr>
+              <a:t>pattern</a:t>
+            </a:r>
+            <a:r>
               <a:rPr lang="nl-NL" dirty="0">
                 <a:solidFill>
                   <a:schemeClr val="bg1"/>
                 </a:solidFill>
               </a:rPr>
-              <a:t> Framework</a:t>
-            </a:r>
-          </a:p>
-          <a:p>
-            <a:pPr marL="342900" indent="-342900" algn="l">
-              <a:buFont typeface="Arial" panose="020B0604020202020204" pitchFamily="34" charset="0"/>
-              <a:buChar char="•"/>
-            </a:pPr>
+              <a:t>	</a:t>
+            </a:r>
+          </a:p>
+          <a:p>
             <a:endParaRPr lang="nl-NL" dirty="0">
               <a:solidFill>
                 <a:schemeClr val="bg1"/>
@@ -6970,121 +7010,81 @@
             </a:endParaRPr>
           </a:p>
           <a:p>
-            <a:pPr marL="342900" indent="-342900" algn="l">
-              <a:buFont typeface="Arial" panose="020B0604020202020204" pitchFamily="34" charset="0"/>
-              <a:buChar char="•"/>
-            </a:pPr>
-            <a:r>
-              <a:rPr lang="nl-NL" dirty="0" err="1">
-                <a:solidFill>
-                  <a:schemeClr val="bg1"/>
-                </a:solidFill>
-              </a:rPr>
-              <a:t>Repository</a:t>
-            </a:r>
             <a:r>
               <a:rPr lang="nl-NL" dirty="0">
                 <a:solidFill>
                   <a:schemeClr val="bg1"/>
                 </a:solidFill>
               </a:rPr>
-              <a:t> </a:t>
-            </a:r>
-            <a:r>
-              <a:rPr lang="nl-NL" dirty="0" err="1">
-                <a:solidFill>
-                  <a:schemeClr val="bg1"/>
-                </a:solidFill>
-              </a:rPr>
-              <a:t>pattern</a:t>
-            </a:r>
-            <a:endParaRPr lang="nl-NL" dirty="0">
-              <a:solidFill>
-                <a:schemeClr val="bg1"/>
-              </a:solidFill>
-            </a:endParaRPr>
-          </a:p>
-          <a:p>
-            <a:pPr marL="342900" indent="-342900" algn="l">
-              <a:buFont typeface="Arial" panose="020B0604020202020204" pitchFamily="34" charset="0"/>
-              <a:buChar char="•"/>
-            </a:pPr>
-            <a:endParaRPr lang="nl-NL" dirty="0">
-              <a:solidFill>
-                <a:schemeClr val="bg1"/>
-              </a:solidFill>
-            </a:endParaRPr>
-          </a:p>
-          <a:p>
-            <a:pPr marL="342900" indent="-342900" algn="l">
-              <a:buFont typeface="Arial" panose="020B0604020202020204" pitchFamily="34" charset="0"/>
-              <a:buChar char="•"/>
-            </a:pPr>
-            <a:r>
-              <a:rPr lang="nl-NL" dirty="0" err="1">
-                <a:solidFill>
-                  <a:schemeClr val="bg1"/>
-                </a:solidFill>
-              </a:rPr>
-              <a:t>Sensitive</a:t>
-            </a:r>
+              <a:t>              Wat zijn deze onderwerpen				Wat is het</a:t>
+            </a:r>
+          </a:p>
+          <a:p>
             <a:r>
               <a:rPr lang="nl-NL" dirty="0">
                 <a:solidFill>
                   <a:schemeClr val="bg1"/>
                 </a:solidFill>
               </a:rPr>
-              <a:t> Data Exposure</a:t>
-            </a:r>
-          </a:p>
-          <a:p>
-            <a:pPr marL="342900" indent="-342900" algn="l">
-              <a:buFont typeface="Arial" panose="020B0604020202020204" pitchFamily="34" charset="0"/>
-              <a:buChar char="•"/>
-            </a:pPr>
-            <a:endParaRPr lang="nl-NL" dirty="0">
-              <a:solidFill>
-                <a:schemeClr val="bg1"/>
-              </a:solidFill>
-            </a:endParaRPr>
-          </a:p>
-        </p:txBody>
-      </p:sp>
-      <p:sp>
-        <p:nvSpPr>
-          <p:cNvPr id="10" name="Titel 1">
-            <a:extLst>
-              <a:ext uri="{FF2B5EF4-FFF2-40B4-BE49-F238E27FC236}">
-                <a16:creationId xmlns:a16="http://schemas.microsoft.com/office/drawing/2014/main" id="{F5A54F81-B54C-4D4D-BD79-C7DB99EFF519}"/>
-              </a:ext>
-            </a:extLst>
-          </p:cNvPr>
-          <p:cNvSpPr>
-            <a:spLocks noGrp="1"/>
-          </p:cNvSpPr>
-          <p:nvPr>
-            <p:ph type="ctrTitle"/>
-          </p:nvPr>
+              <a:t>	                  &amp;					       &amp;</a:t>
+            </a:r>
+          </a:p>
+          <a:p>
+            <a:r>
+              <a:rPr lang="nl-NL" dirty="0">
+                <a:solidFill>
+                  <a:schemeClr val="bg1"/>
+                </a:solidFill>
+              </a:rPr>
+              <a:t>               Hoe implementeer ik deze			          Hoe voorkom ik het</a:t>
+            </a:r>
+          </a:p>
+        </p:txBody>
+      </p:sp>
+      <p:sp>
+        <p:nvSpPr>
+          <p:cNvPr id="7" name="Tekstvak 6">
+            <a:extLst>
+              <a:ext uri="{FF2B5EF4-FFF2-40B4-BE49-F238E27FC236}">
+                <a16:creationId xmlns:a16="http://schemas.microsoft.com/office/drawing/2014/main" id="{52FA46D1-5F5E-45F6-97A5-5D4EC36A8921}"/>
+              </a:ext>
+            </a:extLst>
+          </p:cNvPr>
+          <p:cNvSpPr txBox="1"/>
+          <p:nvPr/>
         </p:nvSpPr>
         <p:spPr>
           <a:xfrm>
-            <a:off x="1524000" y="1122363"/>
-            <a:ext cx="9144000" cy="137270"/>
+            <a:off x="1524000" y="3602038"/>
+            <a:ext cx="8478253" cy="461665"/>
           </a:xfrm>
+          <a:prstGeom prst="rect">
+            <a:avLst/>
+          </a:prstGeom>
+          <a:noFill/>
         </p:spPr>
         <p:txBody>
-          <a:bodyPr>
-            <a:noAutofit/>
+          <a:bodyPr wrap="square" rtlCol="0">
+            <a:spAutoFit/>
           </a:bodyPr>
           <a:lstStyle/>
           <a:p>
-            <a:r>
-              <a:rPr lang="nl-NL" sz="3600" dirty="0">
-                <a:solidFill>
-                  <a:schemeClr val="bg1"/>
-                </a:solidFill>
-              </a:rPr>
-              <a:t>Inhoud</a:t>
+            <a:pPr algn="r"/>
+            <a:r>
+              <a:rPr lang="nl-NL" sz="2400" dirty="0" err="1">
+                <a:solidFill>
+                  <a:schemeClr val="bg1"/>
+                </a:solidFill>
+              </a:rPr>
+              <a:t>Sensitive</a:t>
+            </a:r>
+            <a:r>
+              <a:rPr lang="nl-NL" sz="2400" dirty="0">
+                <a:solidFill>
+                  <a:schemeClr val="bg1"/>
+                </a:solidFill>
+              </a:rPr>
+              <a:t> Data Exposure</a:t>
             </a:r>
           </a:p>
         </p:txBody>
@@ -7092,7 +7092,7 @@
     </p:spTree>
     <p:extLst>
       <p:ext uri="{BB962C8B-B14F-4D97-AF65-F5344CB8AC3E}">
-        <p14:creationId xmlns:p14="http://schemas.microsoft.com/office/powerpoint/2010/main" val="77825839"/>
+        <p14:creationId xmlns:p14="http://schemas.microsoft.com/office/powerpoint/2010/main" val="4129991484"/>
       </p:ext>
     </p:extLst>
   </p:cSld>
@@ -8502,7 +8502,7 @@
                   <a:schemeClr val="bg1"/>
                 </a:solidFill>
               </a:rPr>
-              <a:t>Conceptual</a:t>
+              <a:t>Entity</a:t>
             </a:r>
             <a:r>
               <a:rPr lang="nl-NL" dirty="0">
@@ -8510,41 +8510,8 @@
                   <a:schemeClr val="bg1"/>
                 </a:solidFill>
               </a:rPr>
-              <a:t> model</a:t>
-            </a:r>
-          </a:p>
-          <a:p>
-            <a:pPr marL="342900" indent="-342900" algn="l">
-              <a:buFontTx/>
-              <a:buChar char="-"/>
-            </a:pPr>
-            <a:r>
-              <a:rPr lang="nl-NL" dirty="0">
-                <a:solidFill>
-                  <a:schemeClr val="bg1"/>
-                </a:solidFill>
-              </a:rPr>
-              <a:t>Storage model</a:t>
-            </a:r>
-          </a:p>
-          <a:p>
-            <a:pPr marL="342900" indent="-342900" algn="l">
-              <a:buFontTx/>
-              <a:buChar char="-"/>
-            </a:pPr>
-            <a:r>
-              <a:rPr lang="nl-NL" dirty="0" err="1">
-                <a:solidFill>
-                  <a:schemeClr val="bg1"/>
-                </a:solidFill>
-              </a:rPr>
-              <a:t>Mappings</a:t>
-            </a:r>
-            <a:endParaRPr lang="nl-NL" dirty="0">
-              <a:solidFill>
-                <a:schemeClr val="bg1"/>
-              </a:solidFill>
-            </a:endParaRPr>
+              <a:t> Data Model</a:t>
+            </a:r>
           </a:p>
           <a:p>
             <a:endParaRPr lang="nl-NL" dirty="0">
@@ -8926,7 +8893,7 @@
                   <a:schemeClr val="bg1"/>
                 </a:solidFill>
               </a:rPr>
-              <a:t>http://tiny.cc/EntityWorkshop</a:t>
+              <a:t>http://tiny.cc/Entity-Workshop</a:t>
             </a:r>
           </a:p>
         </p:txBody>

</xml_diff>